<commit_message>
notes edits from class
</commit_message>
<xml_diff>
--- a/Class_Notes/Week12_API.pptx
+++ b/Class_Notes/Week12_API.pptx
@@ -3511,16 +3511,13 @@
             <a:pPr lvl="1"/>
             <a:r>
               <a:rPr lang="en-US" dirty="0"/>
-              <a:t>This Thursday 10-11 in person  </a:t>
-            </a:r>
-            <a:r>
-              <a:rPr lang="en-US" dirty="0" err="1"/>
-              <a:t>Harsbarger</a:t>
-            </a:r>
-            <a:r>
-              <a:rPr lang="en-US" dirty="0"/>
-              <a:t> 324e or by zoom on request</a:t>
-            </a:r>
+              <a:t>This Thursday </a:t>
+            </a:r>
+            <a:r>
+              <a:rPr lang="en-US"/>
+              <a:t>10-11 by zoom </a:t>
+            </a:r>
+            <a:endParaRPr lang="en-US" dirty="0"/>
           </a:p>
           <a:p>
             <a:pPr lvl="1"/>

</xml_diff>